<commit_message>
Zwischenpräsentation (thanks to Richard!): * TYPO (page 9: Beschleunigun(g)swerte) * Fixed distorted graphics (page 9,19)
</commit_message>
<xml_diff>
--- a/Präsentationen/Zwischenpräsentation/Zwischenpräsentation.pptx
+++ b/Präsentationen/Zwischenpräsentation/Zwischenpräsentation.pptx
@@ -211,6 +211,7 @@
           <a:p>
             <a:fld id="{B8B9126B-B982-4FD1-A893-3CC584B25F4B}" type="datetimeFigureOut">
               <a:rPr lang="de-DE" smtClean="0"/>
+              <a:pPr/>
               <a:t>06.06.2013</a:t>
             </a:fld>
             <a:endParaRPr lang="de-DE"/>
@@ -372,6 +373,7 @@
           <a:p>
             <a:fld id="{6C13B498-EF37-488C-B73A-978C9CF4272B}" type="slidenum">
               <a:rPr lang="de-DE" smtClean="0"/>
+              <a:pPr/>
               <a:t>‹Nr.›</a:t>
             </a:fld>
             <a:endParaRPr lang="de-DE"/>
@@ -543,6 +545,7 @@
           <a:p>
             <a:fld id="{6C13B498-EF37-488C-B73A-978C9CF4272B}" type="slidenum">
               <a:rPr lang="de-DE" smtClean="0"/>
+              <a:pPr/>
               <a:t>9</a:t>
             </a:fld>
             <a:endParaRPr lang="de-DE"/>
@@ -817,7 +820,7 @@
           <a:blip r:embed="rId2" cstate="print">
             <a:extLst>
               <a:ext uri="{28A0092B-C50C-407E-A947-70E740481C1C}">
-                <a14:useLocalDpi xmlns:a14="http://schemas.microsoft.com/office/drawing/2010/main" xmlns="" val="0"/>
+                <a14:useLocalDpi xmlns="" xmlns:a14="http://schemas.microsoft.com/office/drawing/2010/main" val="0"/>
               </a:ext>
             </a:extLst>
           </a:blip>
@@ -844,10 +847,10 @@
           <p:nvPr/>
         </p:nvPicPr>
         <p:blipFill>
-          <a:blip r:embed="rId3">
+          <a:blip r:embed="rId3" cstate="print">
             <a:extLst>
               <a:ext uri="{28A0092B-C50C-407E-A947-70E740481C1C}">
-                <a14:useLocalDpi xmlns:a14="http://schemas.microsoft.com/office/drawing/2010/main" xmlns="" val="0"/>
+                <a14:useLocalDpi xmlns="" xmlns:a14="http://schemas.microsoft.com/office/drawing/2010/main" val="0"/>
               </a:ext>
             </a:extLst>
           </a:blip>
@@ -955,16 +958,7 @@
                 </a:solidFill>
                 <a:latin typeface="Verdana" pitchFamily="34" charset="0"/>
               </a:rPr>
-              <a:t>Dresden, </a:t>
-            </a:r>
-            <a:r>
-              <a:rPr lang="de-DE" baseline="0" dirty="0" smtClean="0">
-                <a:solidFill>
-                  <a:schemeClr val="bg1"/>
-                </a:solidFill>
-                <a:latin typeface="Verdana" pitchFamily="34" charset="0"/>
-              </a:rPr>
-              <a:t>07.06.2013</a:t>
+              <a:t>Dresden, 07.06.2013</a:t>
             </a:r>
             <a:endParaRPr lang="de-LU" baseline="0" dirty="0">
               <a:solidFill>
@@ -978,7 +972,7 @@
     </p:spTree>
     <p:extLst>
       <p:ext uri="{BB962C8B-B14F-4D97-AF65-F5344CB8AC3E}">
-        <p14:creationId xmlns:p14="http://schemas.microsoft.com/office/powerpoint/2010/main" xmlns="" val="3895510678"/>
+        <p14:creationId xmlns="" xmlns:p14="http://schemas.microsoft.com/office/powerpoint/2010/main" val="3895510678"/>
       </p:ext>
     </p:extLst>
   </p:cSld>
@@ -1167,7 +1161,7 @@
     </p:spTree>
     <p:extLst>
       <p:ext uri="{BB962C8B-B14F-4D97-AF65-F5344CB8AC3E}">
-        <p14:creationId xmlns:p14="http://schemas.microsoft.com/office/powerpoint/2010/main" xmlns="" val="746049047"/>
+        <p14:creationId xmlns="" xmlns:p14="http://schemas.microsoft.com/office/powerpoint/2010/main" val="746049047"/>
       </p:ext>
     </p:extLst>
   </p:cSld>
@@ -1352,7 +1346,7 @@
     </p:spTree>
     <p:extLst>
       <p:ext uri="{BB962C8B-B14F-4D97-AF65-F5344CB8AC3E}">
-        <p14:creationId xmlns:p14="http://schemas.microsoft.com/office/powerpoint/2010/main" xmlns="" val="3980997614"/>
+        <p14:creationId xmlns="" xmlns:p14="http://schemas.microsoft.com/office/powerpoint/2010/main" val="3980997614"/>
       </p:ext>
     </p:extLst>
   </p:cSld>
@@ -1561,7 +1555,7 @@
     </p:spTree>
     <p:extLst>
       <p:ext uri="{BB962C8B-B14F-4D97-AF65-F5344CB8AC3E}">
-        <p14:creationId xmlns:p14="http://schemas.microsoft.com/office/powerpoint/2010/main" xmlns="" val="864537794"/>
+        <p14:creationId xmlns="" xmlns:p14="http://schemas.microsoft.com/office/powerpoint/2010/main" val="864537794"/>
       </p:ext>
     </p:extLst>
   </p:cSld>
@@ -1819,7 +1813,7 @@
     </p:spTree>
     <p:extLst>
       <p:ext uri="{BB962C8B-B14F-4D97-AF65-F5344CB8AC3E}">
-        <p14:creationId xmlns:p14="http://schemas.microsoft.com/office/powerpoint/2010/main" xmlns="" val="3096267003"/>
+        <p14:creationId xmlns="" xmlns:p14="http://schemas.microsoft.com/office/powerpoint/2010/main" val="3096267003"/>
       </p:ext>
     </p:extLst>
   </p:cSld>
@@ -1906,7 +1900,7 @@
     </p:spTree>
     <p:extLst>
       <p:ext uri="{BB962C8B-B14F-4D97-AF65-F5344CB8AC3E}">
-        <p14:creationId xmlns:p14="http://schemas.microsoft.com/office/powerpoint/2010/main" xmlns="" val="125811599"/>
+        <p14:creationId xmlns="" xmlns:p14="http://schemas.microsoft.com/office/powerpoint/2010/main" val="125811599"/>
       </p:ext>
     </p:extLst>
   </p:cSld>
@@ -1966,7 +1960,7 @@
     </p:spTree>
     <p:extLst>
       <p:ext uri="{BB962C8B-B14F-4D97-AF65-F5344CB8AC3E}">
-        <p14:creationId xmlns:p14="http://schemas.microsoft.com/office/powerpoint/2010/main" xmlns="" val="1997221656"/>
+        <p14:creationId xmlns="" xmlns:p14="http://schemas.microsoft.com/office/powerpoint/2010/main" val="1997221656"/>
       </p:ext>
     </p:extLst>
   </p:cSld>
@@ -2208,7 +2202,7 @@
     </p:spTree>
     <p:extLst>
       <p:ext uri="{BB962C8B-B14F-4D97-AF65-F5344CB8AC3E}">
-        <p14:creationId xmlns:p14="http://schemas.microsoft.com/office/powerpoint/2010/main" xmlns="" val="2865223639"/>
+        <p14:creationId xmlns="" xmlns:p14="http://schemas.microsoft.com/office/powerpoint/2010/main" val="2865223639"/>
       </p:ext>
     </p:extLst>
   </p:cSld>
@@ -2430,7 +2424,7 @@
     </p:spTree>
     <p:extLst>
       <p:ext uri="{BB962C8B-B14F-4D97-AF65-F5344CB8AC3E}">
-        <p14:creationId xmlns:p14="http://schemas.microsoft.com/office/powerpoint/2010/main" xmlns="" val="910054967"/>
+        <p14:creationId xmlns="" xmlns:p14="http://schemas.microsoft.com/office/powerpoint/2010/main" val="910054967"/>
       </p:ext>
     </p:extLst>
   </p:cSld>
@@ -2609,7 +2603,7 @@
     </p:spTree>
     <p:extLst>
       <p:ext uri="{BB962C8B-B14F-4D97-AF65-F5344CB8AC3E}">
-        <p14:creationId xmlns:p14="http://schemas.microsoft.com/office/powerpoint/2010/main" xmlns="" val="914972090"/>
+        <p14:creationId xmlns="" xmlns:p14="http://schemas.microsoft.com/office/powerpoint/2010/main" val="914972090"/>
       </p:ext>
     </p:extLst>
   </p:cSld>
@@ -2793,7 +2787,7 @@
           <a:blip r:embed="rId12" cstate="print">
             <a:extLst>
               <a:ext uri="{28A0092B-C50C-407E-A947-70E740481C1C}">
-                <a14:useLocalDpi xmlns:a14="http://schemas.microsoft.com/office/drawing/2010/main" xmlns="" val="0"/>
+                <a14:useLocalDpi xmlns="" xmlns:a14="http://schemas.microsoft.com/office/drawing/2010/main" val="0"/>
               </a:ext>
             </a:extLst>
           </a:blip>
@@ -2917,16 +2911,7 @@
                 </a:solidFill>
                 <a:latin typeface="Verdana" pitchFamily="34" charset="0"/>
               </a:rPr>
-              <a:t> von </a:t>
-            </a:r>
-            <a:r>
-              <a:rPr lang="de-DE" sz="1000" baseline="0" dirty="0" smtClean="0">
-                <a:solidFill>
-                  <a:schemeClr val="bg2"/>
-                </a:solidFill>
-                <a:latin typeface="Verdana" pitchFamily="34" charset="0"/>
-              </a:rPr>
-              <a:t>20</a:t>
+              <a:t> von 20</a:t>
             </a:r>
             <a:endParaRPr lang="de-LU" sz="1000" baseline="0" dirty="0">
               <a:solidFill>
@@ -3015,7 +3000,7 @@
     </p:spTree>
     <p:extLst>
       <p:ext uri="{BB962C8B-B14F-4D97-AF65-F5344CB8AC3E}">
-        <p14:creationId xmlns:p14="http://schemas.microsoft.com/office/powerpoint/2010/main" xmlns="" val="3975170595"/>
+        <p14:creationId xmlns="" xmlns:p14="http://schemas.microsoft.com/office/powerpoint/2010/main" val="3975170595"/>
       </p:ext>
     </p:extLst>
   </p:cSld>
@@ -3453,13 +3438,8 @@
             <a:pPr eaLnBrk="1" hangingPunct="1"/>
             <a:r>
               <a:rPr lang="de-DE" dirty="0" smtClean="0"/>
-              <a:t>4</a:t>
-            </a:r>
-            <a:r>
-              <a:rPr lang="de-DE" dirty="0" smtClean="0"/>
-              <a:t> Statistik</a:t>
-            </a:r>
-            <a:endParaRPr lang="de-DE" dirty="0" smtClean="0"/>
+              <a:t>4 Statistik</a:t>
+            </a:r>
           </a:p>
         </p:txBody>
       </p:sp>
@@ -3559,7 +3539,6 @@
               <a:rPr lang="de-DE" sz="1500" b="1" dirty="0" smtClean="0"/>
               <a:t>Weitere optionale Aufgaben:</a:t>
             </a:r>
-            <a:endParaRPr lang="de-DE" sz="1500" b="1" dirty="0" smtClean="0"/>
           </a:p>
           <a:p>
             <a:pPr>
@@ -3629,7 +3608,6 @@
               <a:rPr lang="en-US" sz="1600" dirty="0" smtClean="0"/>
               <a:t>)</a:t>
             </a:r>
-            <a:endParaRPr lang="en-US" sz="1600" dirty="0" smtClean="0"/>
           </a:p>
           <a:p>
             <a:pPr>
@@ -3731,13 +3709,8 @@
             <a:pPr eaLnBrk="1" hangingPunct="1"/>
             <a:r>
               <a:rPr lang="de-DE" dirty="0" smtClean="0"/>
-              <a:t>5</a:t>
-            </a:r>
-            <a:r>
-              <a:rPr lang="de-DE" dirty="0" smtClean="0"/>
-              <a:t> Prognose</a:t>
-            </a:r>
-            <a:endParaRPr lang="de-DE" dirty="0" smtClean="0"/>
+              <a:t>5 Prognose</a:t>
+            </a:r>
           </a:p>
         </p:txBody>
       </p:sp>
@@ -3800,11 +3773,6 @@
               </a:rPr>
               <a:t>Onur Ekici, Philipp Geißler</a:t>
             </a:r>
-            <a:endParaRPr lang="de-DE" sz="1600" dirty="0" smtClean="0">
-              <a:solidFill>
-                <a:srgbClr val="0B2A51"/>
-              </a:solidFill>
-            </a:endParaRPr>
           </a:p>
           <a:p>
             <a:pPr eaLnBrk="1" hangingPunct="1">
@@ -3873,7 +3841,6 @@
               <a:rPr lang="de-DE" sz="1500" b="1" dirty="0" smtClean="0"/>
               <a:t>Tools:</a:t>
             </a:r>
-            <a:endParaRPr lang="de-DE" sz="1500" b="1" dirty="0" smtClean="0"/>
           </a:p>
           <a:p>
             <a:endParaRPr lang="de-DE" sz="1100" b="1" dirty="0" smtClean="0"/>
@@ -3909,11 +3876,7 @@
             </a:pPr>
             <a:r>
               <a:rPr lang="en-US" sz="1600" dirty="0" smtClean="0"/>
-              <a:t> </a:t>
-            </a:r>
-            <a:r>
-              <a:rPr lang="en-US" sz="1600" dirty="0" smtClean="0"/>
-              <a:t>MOA – Massive On-Line Analysis</a:t>
+              <a:t> MOA – Massive On-Line Analysis</a:t>
             </a:r>
             <a:endParaRPr lang="de-DE" sz="1600" dirty="0" smtClean="0"/>
           </a:p>
@@ -3938,7 +3901,7 @@
           <p:nvPr/>
         </p:nvPicPr>
         <p:blipFill>
-          <a:blip r:embed="rId2"/>
+          <a:blip r:embed="rId2" cstate="print"/>
           <a:srcRect/>
           <a:stretch>
             <a:fillRect/>
@@ -3964,7 +3927,7 @@
           <p:nvPr/>
         </p:nvPicPr>
         <p:blipFill>
-          <a:blip r:embed="rId3"/>
+          <a:blip r:embed="rId3" cstate="print"/>
           <a:srcRect/>
           <a:stretch>
             <a:fillRect/>
@@ -4061,13 +4024,8 @@
             <a:pPr eaLnBrk="1" hangingPunct="1"/>
             <a:r>
               <a:rPr lang="de-DE" dirty="0" smtClean="0"/>
-              <a:t>5</a:t>
-            </a:r>
-            <a:r>
-              <a:rPr lang="de-DE" dirty="0" smtClean="0"/>
-              <a:t> Prognose</a:t>
-            </a:r>
-            <a:endParaRPr lang="de-DE" dirty="0" smtClean="0"/>
+              <a:t>5 Prognose</a:t>
+            </a:r>
           </a:p>
         </p:txBody>
       </p:sp>
@@ -4105,11 +4063,6 @@
               </a:rPr>
               <a:t>Ablaufplan:</a:t>
             </a:r>
-            <a:endParaRPr lang="de-DE" sz="1500" b="1" dirty="0" smtClean="0">
-              <a:solidFill>
-                <a:srgbClr val="0B2A51"/>
-              </a:solidFill>
-            </a:endParaRPr>
           </a:p>
           <a:p>
             <a:pPr>
@@ -5264,7 +5217,7 @@
           <p:nvPr/>
         </p:nvPicPr>
         <p:blipFill>
-          <a:blip r:embed="rId2"/>
+          <a:blip r:embed="rId2" cstate="print"/>
           <a:srcRect/>
           <a:stretch>
             <a:fillRect/>
@@ -5366,7 +5319,7 @@
           <p:nvPr/>
         </p:nvPicPr>
         <p:blipFill>
-          <a:blip r:embed="rId3"/>
+          <a:blip r:embed="rId3" cstate="print"/>
           <a:srcRect/>
           <a:stretch>
             <a:fillRect/>
@@ -5392,7 +5345,7 @@
           <p:nvPr/>
         </p:nvPicPr>
         <p:blipFill>
-          <a:blip r:embed="rId4"/>
+          <a:blip r:embed="rId4" cstate="print"/>
           <a:srcRect/>
           <a:stretch>
             <a:fillRect/>
@@ -5489,13 +5442,8 @@
             <a:pPr eaLnBrk="1" hangingPunct="1"/>
             <a:r>
               <a:rPr lang="de-DE" dirty="0" smtClean="0"/>
-              <a:t>5</a:t>
-            </a:r>
-            <a:r>
-              <a:rPr lang="de-DE" dirty="0" smtClean="0"/>
-              <a:t> Prognose</a:t>
-            </a:r>
-            <a:endParaRPr lang="de-DE" dirty="0" smtClean="0"/>
+              <a:t>5 Prognose</a:t>
+            </a:r>
           </a:p>
         </p:txBody>
       </p:sp>
@@ -5549,11 +5497,6 @@
               </a:rPr>
               <a:t> Events):</a:t>
             </a:r>
-            <a:endParaRPr lang="de-DE" sz="1500" b="1" dirty="0" smtClean="0">
-              <a:solidFill>
-                <a:srgbClr val="0B2A51"/>
-              </a:solidFill>
-            </a:endParaRPr>
           </a:p>
           <a:p>
             <a:pPr eaLnBrk="1" hangingPunct="1">
@@ -5604,7 +5547,6 @@
               <a:rPr lang="de-DE" sz="1400" dirty="0" smtClean="0"/>
               <a:t>Fehlpass</a:t>
             </a:r>
-            <a:endParaRPr lang="de-DE" sz="1400" dirty="0" smtClean="0"/>
           </a:p>
           <a:p>
             <a:pPr>
@@ -6032,13 +5974,8 @@
             <a:pPr eaLnBrk="1" hangingPunct="1"/>
             <a:r>
               <a:rPr lang="de-DE" dirty="0" smtClean="0"/>
-              <a:t>5</a:t>
-            </a:r>
-            <a:r>
-              <a:rPr lang="de-DE" dirty="0" smtClean="0"/>
-              <a:t> Prognose</a:t>
-            </a:r>
-            <a:endParaRPr lang="de-DE" dirty="0" smtClean="0"/>
+              <a:t>5 Prognose</a:t>
+            </a:r>
           </a:p>
         </p:txBody>
       </p:sp>
@@ -6092,11 +6029,6 @@
               </a:rPr>
               <a:t> Learning:</a:t>
             </a:r>
-            <a:endParaRPr lang="de-DE" sz="1500" b="1" dirty="0" smtClean="0">
-              <a:solidFill>
-                <a:srgbClr val="0B2A51"/>
-              </a:solidFill>
-            </a:endParaRPr>
           </a:p>
           <a:p>
             <a:pPr eaLnBrk="1" hangingPunct="1">
@@ -6233,7 +6165,7 @@
           <p:nvPr/>
         </p:nvPicPr>
         <p:blipFill>
-          <a:blip r:embed="rId2"/>
+          <a:blip r:embed="rId2" cstate="print"/>
           <a:srcRect/>
           <a:stretch>
             <a:fillRect/>
@@ -6259,7 +6191,7 @@
           <p:nvPr/>
         </p:nvPicPr>
         <p:blipFill>
-          <a:blip r:embed="rId3"/>
+          <a:blip r:embed="rId3" cstate="print"/>
           <a:srcRect/>
           <a:stretch>
             <a:fillRect/>
@@ -6356,13 +6288,8 @@
             <a:pPr eaLnBrk="1" hangingPunct="1"/>
             <a:r>
               <a:rPr lang="de-DE" dirty="0" smtClean="0"/>
-              <a:t>6</a:t>
-            </a:r>
-            <a:r>
-              <a:rPr lang="de-DE" dirty="0" smtClean="0"/>
-              <a:t> Visualisierung</a:t>
-            </a:r>
-            <a:endParaRPr lang="de-DE" dirty="0" smtClean="0"/>
+              <a:t>6 Visualisierung</a:t>
+            </a:r>
           </a:p>
         </p:txBody>
       </p:sp>
@@ -6425,11 +6352,6 @@
               </a:rPr>
               <a:t>Kevin Angermann, Peter Schwede</a:t>
             </a:r>
-            <a:endParaRPr lang="de-DE" sz="1600" dirty="0" smtClean="0">
-              <a:solidFill>
-                <a:srgbClr val="0B2A51"/>
-              </a:solidFill>
-            </a:endParaRPr>
           </a:p>
           <a:p>
             <a:pPr eaLnBrk="1" hangingPunct="1">
@@ -6475,7 +6397,7 @@
           <p:nvPr/>
         </p:nvPicPr>
         <p:blipFill>
-          <a:blip r:embed="rId2"/>
+          <a:blip r:embed="rId2" cstate="print"/>
           <a:srcRect/>
           <a:stretch>
             <a:fillRect/>
@@ -6508,7 +6430,7 @@
           <p:nvPr/>
         </p:nvPicPr>
         <p:blipFill>
-          <a:blip r:embed="rId3"/>
+          <a:blip r:embed="rId3" cstate="print"/>
           <a:srcRect/>
           <a:stretch>
             <a:fillRect/>
@@ -6596,7 +6518,7 @@
           <p:nvPr/>
         </p:nvPicPr>
         <p:blipFill>
-          <a:blip r:embed="rId2"/>
+          <a:blip r:embed="rId2" cstate="print"/>
           <a:srcRect/>
           <a:stretch>
             <a:fillRect/>
@@ -6645,13 +6567,8 @@
             <a:pPr eaLnBrk="1" hangingPunct="1"/>
             <a:r>
               <a:rPr lang="de-DE" dirty="0" smtClean="0"/>
-              <a:t>6</a:t>
-            </a:r>
-            <a:r>
-              <a:rPr lang="de-DE" dirty="0" smtClean="0"/>
-              <a:t> Visualisierung</a:t>
-            </a:r>
-            <a:endParaRPr lang="de-DE" dirty="0" smtClean="0"/>
+              <a:t>6 Visualisierung</a:t>
+            </a:r>
           </a:p>
         </p:txBody>
       </p:sp>
@@ -6780,13 +6697,8 @@
             <a:pPr eaLnBrk="1" hangingPunct="1"/>
             <a:r>
               <a:rPr lang="de-DE" dirty="0" smtClean="0"/>
-              <a:t>6</a:t>
-            </a:r>
-            <a:r>
-              <a:rPr lang="de-DE" dirty="0" smtClean="0"/>
-              <a:t> Visualisierung</a:t>
-            </a:r>
-            <a:endParaRPr lang="de-DE" dirty="0" smtClean="0"/>
+              <a:t>6 Visualisierung</a:t>
+            </a:r>
           </a:p>
         </p:txBody>
       </p:sp>
@@ -6906,16 +6818,7 @@
                 </a:solidFill>
                 <a:latin typeface="Verdana" pitchFamily="34" charset="0"/>
               </a:rPr>
-              <a:t> </a:t>
-            </a:r>
-            <a:r>
-              <a:rPr lang="de-DE" sz="1600" dirty="0" smtClean="0">
-                <a:solidFill>
-                  <a:srgbClr val="0B2A51"/>
-                </a:solidFill>
-                <a:latin typeface="Verdana" pitchFamily="34" charset="0"/>
-              </a:rPr>
-              <a:t>Spiel läuft in Echtzeit</a:t>
+              <a:t> Spiel läuft in Echtzeit</a:t>
             </a:r>
             <a:endParaRPr kumimoji="0" lang="de-DE" sz="1600" b="0" i="0" u="none" strike="noStrike" kern="1200" cap="none" spc="0" normalizeH="0" baseline="0" noProof="0" dirty="0" smtClean="0">
               <a:ln>
@@ -7057,15 +6960,7 @@
                 <a:ea typeface="Verdana" pitchFamily="34" charset="0"/>
                 <a:cs typeface="Verdana" pitchFamily="34" charset="0"/>
               </a:rPr>
-              <a:t>Ereignisse (Tor, Karte, Verletzung …) in zeitlicher Abfolge </a:t>
-            </a:r>
-            <a:r>
-              <a:rPr lang="de-DE" sz="1600" dirty="0" smtClean="0">
-                <a:latin typeface="Verdana" pitchFamily="34" charset="0"/>
-                <a:ea typeface="Verdana" pitchFamily="34" charset="0"/>
-                <a:cs typeface="Verdana" pitchFamily="34" charset="0"/>
-              </a:rPr>
-              <a:t>abbilden</a:t>
+              <a:t>Ereignisse (Tor, Karte, Verletzung …) in zeitlicher Abfolge abbilden</a:t>
             </a:r>
           </a:p>
           <a:p>
@@ -7145,12 +7040,6 @@
               </a:rPr>
               <a:t>Teamübersicht:</a:t>
             </a:r>
-            <a:endParaRPr lang="de-DE" sz="1500" b="1" dirty="0" smtClean="0">
-              <a:solidFill>
-                <a:srgbClr val="0B2A51"/>
-              </a:solidFill>
-              <a:latin typeface="Verdana" pitchFamily="34" charset="0"/>
-            </a:endParaRPr>
           </a:p>
           <a:p>
             <a:pPr lvl="0">
@@ -7183,8 +7072,22 @@
                 <a:ea typeface="Verdana" pitchFamily="34" charset="0"/>
                 <a:cs typeface="Verdana" pitchFamily="34" charset="0"/>
               </a:rPr>
-              <a:t> </a:t>
-            </a:r>
+              <a:t> Tabellenartige Ansicht beider Teams</a:t>
+            </a:r>
+            <a:endParaRPr lang="de-DE" sz="1600" dirty="0" smtClean="0">
+              <a:latin typeface="Verdana" pitchFamily="34" charset="0"/>
+              <a:ea typeface="Verdana" pitchFamily="34" charset="0"/>
+              <a:cs typeface="Verdana" pitchFamily="34" charset="0"/>
+            </a:endParaRPr>
+          </a:p>
+          <a:p>
+            <a:pPr lvl="0">
+              <a:spcBef>
+                <a:spcPct val="20000"/>
+              </a:spcBef>
+              <a:buFont typeface="Arial" pitchFamily="34" charset="0"/>
+              <a:buChar char="•"/>
+            </a:pPr>
             <a:r>
               <a:rPr lang="de-DE" sz="1600" dirty="0" smtClean="0">
                 <a:solidFill>
@@ -7194,13 +7097,8 @@
                 <a:ea typeface="Verdana" pitchFamily="34" charset="0"/>
                 <a:cs typeface="Verdana" pitchFamily="34" charset="0"/>
               </a:rPr>
-              <a:t>Tabellenartige Ansicht beider Teams</a:t>
-            </a:r>
-            <a:endParaRPr lang="de-DE" sz="1600" dirty="0" smtClean="0">
-              <a:latin typeface="Verdana" pitchFamily="34" charset="0"/>
-              <a:ea typeface="Verdana" pitchFamily="34" charset="0"/>
-              <a:cs typeface="Verdana" pitchFamily="34" charset="0"/>
-            </a:endParaRPr>
+              <a:t> Allgemeine Informationen/Leistungsdaten zu jedem Spieler</a:t>
+            </a:r>
           </a:p>
           <a:p>
             <a:pPr lvl="0">
@@ -7219,49 +7117,7 @@
                 <a:ea typeface="Verdana" pitchFamily="34" charset="0"/>
                 <a:cs typeface="Verdana" pitchFamily="34" charset="0"/>
               </a:rPr>
-              <a:t> </a:t>
-            </a:r>
-            <a:r>
-              <a:rPr lang="de-DE" sz="1600" dirty="0" smtClean="0">
-                <a:solidFill>
-                  <a:srgbClr val="0B2A51"/>
-                </a:solidFill>
-                <a:latin typeface="Verdana" pitchFamily="34" charset="0"/>
-                <a:ea typeface="Verdana" pitchFamily="34" charset="0"/>
-                <a:cs typeface="Verdana" pitchFamily="34" charset="0"/>
-              </a:rPr>
-              <a:t>Allgemeine Informationen/Leistungsdaten zu jedem Spieler</a:t>
-            </a:r>
-          </a:p>
-          <a:p>
-            <a:pPr lvl="0">
-              <a:spcBef>
-                <a:spcPct val="20000"/>
-              </a:spcBef>
-              <a:buFont typeface="Arial" pitchFamily="34" charset="0"/>
-              <a:buChar char="•"/>
-            </a:pPr>
-            <a:r>
-              <a:rPr lang="de-DE" sz="1600" dirty="0" smtClean="0">
-                <a:solidFill>
-                  <a:srgbClr val="0B2A51"/>
-                </a:solidFill>
-                <a:latin typeface="Verdana" pitchFamily="34" charset="0"/>
-                <a:ea typeface="Verdana" pitchFamily="34" charset="0"/>
-                <a:cs typeface="Verdana" pitchFamily="34" charset="0"/>
-              </a:rPr>
-              <a:t> </a:t>
-            </a:r>
-            <a:r>
-              <a:rPr lang="de-DE" sz="1600" dirty="0" smtClean="0">
-                <a:solidFill>
-                  <a:srgbClr val="0B2A51"/>
-                </a:solidFill>
-                <a:latin typeface="Verdana" pitchFamily="34" charset="0"/>
-                <a:ea typeface="Verdana" pitchFamily="34" charset="0"/>
-                <a:cs typeface="Verdana" pitchFamily="34" charset="0"/>
-              </a:rPr>
-              <a:t>Selektion eines Spielers </a:t>
+              <a:t> Selektion eines Spielers </a:t>
             </a:r>
             <a:r>
               <a:rPr lang="de-DE" sz="1600" dirty="0" smtClean="0"/>
@@ -7278,14 +7134,6 @@
               </a:rPr>
               <a:t> Interaktion mit anderen Komponenten</a:t>
             </a:r>
-            <a:endParaRPr lang="de-DE" sz="1600" dirty="0" smtClean="0">
-              <a:solidFill>
-                <a:srgbClr val="0B2A51"/>
-              </a:solidFill>
-              <a:latin typeface="Verdana" pitchFamily="34" charset="0"/>
-              <a:ea typeface="Verdana" pitchFamily="34" charset="0"/>
-              <a:cs typeface="Verdana" pitchFamily="34" charset="0"/>
-            </a:endParaRPr>
           </a:p>
           <a:p>
             <a:pPr lvl="0">
@@ -7392,13 +7240,8 @@
             <a:pPr eaLnBrk="1" hangingPunct="1"/>
             <a:r>
               <a:rPr lang="de-DE" dirty="0" smtClean="0"/>
-              <a:t>6</a:t>
-            </a:r>
-            <a:r>
-              <a:rPr lang="de-DE" dirty="0" smtClean="0"/>
-              <a:t> Visualisierung</a:t>
-            </a:r>
-            <a:endParaRPr lang="de-DE" dirty="0" smtClean="0"/>
+              <a:t>6 Visualisierung</a:t>
+            </a:r>
           </a:p>
         </p:txBody>
       </p:sp>
@@ -7518,16 +7361,7 @@
                 </a:solidFill>
                 <a:latin typeface="Verdana" pitchFamily="34" charset="0"/>
               </a:rPr>
-              <a:t> </a:t>
-            </a:r>
-            <a:r>
-              <a:rPr lang="de-DE" sz="1600" dirty="0" smtClean="0">
-                <a:solidFill>
-                  <a:srgbClr val="0B2A51"/>
-                </a:solidFill>
-                <a:latin typeface="Verdana" pitchFamily="34" charset="0"/>
-              </a:rPr>
-              <a:t>Informationen über aktuell selektieren Spieler</a:t>
+              <a:t> Informationen über aktuell selektieren Spieler</a:t>
             </a:r>
           </a:p>
           <a:p>
@@ -7563,24 +7397,7 @@
                 <a:ea typeface="Verdana" pitchFamily="34" charset="0"/>
                 <a:cs typeface="Verdana" pitchFamily="34" charset="0"/>
               </a:rPr>
-              <a:t> </a:t>
-            </a:r>
-            <a:r>
-              <a:rPr kumimoji="0" lang="de-DE" sz="1600" i="0" u="none" strike="noStrike" kern="1200" cap="none" spc="0" normalizeH="0" noProof="0" dirty="0" smtClean="0">
-                <a:ln>
-                  <a:noFill/>
-                </a:ln>
-                <a:solidFill>
-                  <a:srgbClr val="0B2A51"/>
-                </a:solidFill>
-                <a:effectLst/>
-                <a:uLnTx/>
-                <a:uFillTx/>
-                <a:latin typeface="Verdana" pitchFamily="34" charset="0"/>
-                <a:ea typeface="Verdana" pitchFamily="34" charset="0"/>
-                <a:cs typeface="Verdana" pitchFamily="34" charset="0"/>
-              </a:rPr>
-              <a:t>Je Reiter andere personenbezogene Leistungsdaten</a:t>
+              <a:t> Je Reiter andere personenbezogene Leistungsdaten</a:t>
             </a:r>
           </a:p>
           <a:p>
@@ -7690,12 +7507,6 @@
               </a:rPr>
               <a:t>Taktische Übersicht:</a:t>
             </a:r>
-            <a:endParaRPr lang="de-DE" sz="1500" b="1" dirty="0" smtClean="0">
-              <a:solidFill>
-                <a:srgbClr val="0B2A51"/>
-              </a:solidFill>
-              <a:latin typeface="Verdana" pitchFamily="34" charset="0"/>
-            </a:endParaRPr>
           </a:p>
           <a:p>
             <a:pPr lvl="0">
@@ -7727,16 +7538,7 @@
                 </a:solidFill>
                 <a:latin typeface="Verdana" pitchFamily="34" charset="0"/>
               </a:rPr>
-              <a:t> </a:t>
-            </a:r>
-            <a:r>
-              <a:rPr lang="de-DE" sz="1600" dirty="0" smtClean="0">
-                <a:solidFill>
-                  <a:srgbClr val="0B2A51"/>
-                </a:solidFill>
-                <a:latin typeface="Verdana" pitchFamily="34" charset="0"/>
-              </a:rPr>
-              <a:t>Zeigt alle Spielerbewegungen in Echtzeit</a:t>
+              <a:t> Zeigt alle Spielerbewegungen in Echtzeit</a:t>
             </a:r>
           </a:p>
           <a:p>
@@ -7757,18 +7559,7 @@
                 <a:ea typeface="Verdana" pitchFamily="34" charset="0"/>
                 <a:cs typeface="Verdana" pitchFamily="34" charset="0"/>
               </a:rPr>
-              <a:t> </a:t>
-            </a:r>
-            <a:r>
-              <a:rPr lang="de-DE" sz="1600" dirty="0" smtClean="0">
-                <a:solidFill>
-                  <a:srgbClr val="0B2A51"/>
-                </a:solidFill>
-                <a:latin typeface="Verdana" pitchFamily="34" charset="0"/>
-                <a:ea typeface="Verdana" pitchFamily="34" charset="0"/>
-                <a:cs typeface="Verdana" pitchFamily="34" charset="0"/>
-              </a:rPr>
-              <a:t>Verschiedene statistische Ansichten (</a:t>
+              <a:t> Verschiedene statistische Ansichten (</a:t>
             </a:r>
             <a:r>
               <a:rPr lang="de-DE" sz="1600" dirty="0" err="1" smtClean="0">
@@ -7811,27 +7602,8 @@
                 <a:ea typeface="Verdana" pitchFamily="34" charset="0"/>
                 <a:cs typeface="Verdana" pitchFamily="34" charset="0"/>
               </a:rPr>
-              <a:t> </a:t>
-            </a:r>
-            <a:r>
-              <a:rPr lang="de-DE" sz="1600" dirty="0" smtClean="0">
-                <a:solidFill>
-                  <a:srgbClr val="0B2A51"/>
-                </a:solidFill>
-                <a:latin typeface="Verdana" pitchFamily="34" charset="0"/>
-                <a:ea typeface="Verdana" pitchFamily="34" charset="0"/>
-                <a:cs typeface="Verdana" pitchFamily="34" charset="0"/>
-              </a:rPr>
-              <a:t>Aktuell selektierter Spieler hervorgehoben</a:t>
-            </a:r>
-            <a:endParaRPr lang="de-DE" sz="1600" dirty="0" smtClean="0">
-              <a:solidFill>
-                <a:srgbClr val="0B2A51"/>
-              </a:solidFill>
-              <a:latin typeface="Verdana" pitchFamily="34" charset="0"/>
-              <a:ea typeface="Verdana" pitchFamily="34" charset="0"/>
-              <a:cs typeface="Verdana" pitchFamily="34" charset="0"/>
-            </a:endParaRPr>
+              <a:t> Aktuell selektierter Spieler hervorgehoben</a:t>
+            </a:r>
           </a:p>
           <a:p>
             <a:pPr marL="0" marR="0" lvl="0" indent="0" algn="l" defTabSz="914400" rtl="0" eaLnBrk="1" fontAlgn="auto" latinLnBrk="0" hangingPunct="1">
@@ -7938,6 +7710,54 @@
           </a:p>
         </p:txBody>
       </p:sp>
+      <p:sp>
+        <p:nvSpPr>
+          <p:cNvPr id="6" name="Rechteck 5"/>
+          <p:cNvSpPr/>
+          <p:nvPr/>
+        </p:nvSpPr>
+        <p:spPr>
+          <a:xfrm>
+            <a:off x="431540" y="5337212"/>
+            <a:ext cx="7920880" cy="1368152"/>
+          </a:xfrm>
+          <a:prstGeom prst="rect">
+            <a:avLst/>
+          </a:prstGeom>
+          <a:solidFill>
+            <a:schemeClr val="bg1"/>
+          </a:solidFill>
+          <a:ln>
+            <a:solidFill>
+              <a:schemeClr val="bg1"/>
+            </a:solidFill>
+          </a:ln>
+        </p:spPr>
+        <p:style>
+          <a:lnRef idx="2">
+            <a:schemeClr val="accent1">
+              <a:shade val="50000"/>
+            </a:schemeClr>
+          </a:lnRef>
+          <a:fillRef idx="1">
+            <a:schemeClr val="accent1"/>
+          </a:fillRef>
+          <a:effectRef idx="0">
+            <a:schemeClr val="accent1"/>
+          </a:effectRef>
+          <a:fontRef idx="minor">
+            <a:schemeClr val="lt1"/>
+          </a:fontRef>
+        </p:style>
+        <p:txBody>
+          <a:bodyPr rtlCol="0" anchor="ctr"/>
+          <a:lstStyle/>
+          <a:p>
+            <a:pPr algn="ctr"/>
+            <a:endParaRPr lang="de-DE"/>
+          </a:p>
+        </p:txBody>
+      </p:sp>
       <p:pic>
         <p:nvPicPr>
           <p:cNvPr id="4" name="Picture 2"/>
@@ -7947,28 +7767,23 @@
           <p:nvPr/>
         </p:nvPicPr>
         <p:blipFill>
-          <a:blip r:embed="rId2"/>
-          <a:srcRect/>
+          <a:blip r:embed="rId2" cstate="print"/>
           <a:stretch>
             <a:fillRect/>
           </a:stretch>
         </p:blipFill>
         <p:spPr bwMode="auto">
           <a:xfrm>
-            <a:off x="701622" y="2297097"/>
-            <a:ext cx="7886808" cy="4407086"/>
+            <a:off x="1295636" y="2267490"/>
+            <a:ext cx="6120680" cy="4590510"/>
           </a:xfrm>
           <a:prstGeom prst="rect">
             <a:avLst/>
           </a:prstGeom>
           <a:noFill/>
-          <a:ln w="9525">
+          <a:ln>
             <a:noFill/>
-            <a:round/>
-            <a:headEnd/>
-            <a:tailEnd/>
           </a:ln>
-          <a:effectLst/>
         </p:spPr>
       </p:pic>
       <p:sp>
@@ -7996,13 +7811,8 @@
             <a:pPr eaLnBrk="1" hangingPunct="1"/>
             <a:r>
               <a:rPr lang="de-DE" dirty="0" smtClean="0"/>
-              <a:t>6</a:t>
-            </a:r>
-            <a:r>
-              <a:rPr lang="de-DE" dirty="0" smtClean="0"/>
-              <a:t> Visualisierung</a:t>
-            </a:r>
-            <a:endParaRPr lang="de-DE" dirty="0" smtClean="0"/>
+              <a:t>6 Visualisierung</a:t>
+            </a:r>
           </a:p>
         </p:txBody>
       </p:sp>
@@ -8361,7 +8171,7 @@
           </p:nvPr>
         </p:nvPicPr>
         <p:blipFill>
-          <a:blip r:embed="rId2"/>
+          <a:blip r:embed="rId2" cstate="print"/>
           <a:stretch>
             <a:fillRect/>
           </a:stretch>
@@ -8563,7 +8373,7 @@
           <p:nvPr/>
         </p:nvPicPr>
         <p:blipFill>
-          <a:blip r:embed="rId2"/>
+          <a:blip r:embed="rId2" cstate="print"/>
           <a:stretch>
             <a:fillRect/>
           </a:stretch>
@@ -8801,7 +8611,7 @@
           <p:nvPr/>
         </p:nvPicPr>
         <p:blipFill>
-          <a:blip r:embed="rId2"/>
+          <a:blip r:embed="rId2" cstate="print"/>
           <a:stretch>
             <a:fillRect/>
           </a:stretch>
@@ -9067,7 +8877,15 @@
             </a:r>
             <a:r>
               <a:rPr lang="de-DE" sz="1600" dirty="0" smtClean="0"/>
-              <a:t>Stream-basierte Übertragung der  Daten zum </a:t>
+              <a:t>Stream-basierte Übertragung der </a:t>
+            </a:r>
+            <a:r>
+              <a:rPr lang="de-DE" sz="1600" dirty="0" smtClean="0"/>
+              <a:t>Daten </a:t>
+            </a:r>
+            <a:r>
+              <a:rPr lang="de-DE" sz="1600" dirty="0" smtClean="0"/>
+              <a:t>zum </a:t>
             </a:r>
             <a:r>
               <a:rPr lang="de-DE" sz="1600" dirty="0" err="1" smtClean="0"/>
@@ -9089,7 +8907,7 @@
           <p:nvPr/>
         </p:nvPicPr>
         <p:blipFill>
-          <a:blip r:embed="rId2"/>
+          <a:blip r:embed="rId2" cstate="print"/>
           <a:stretch>
             <a:fillRect/>
           </a:stretch>
@@ -12706,7 +12524,7 @@
           <p:nvPr/>
         </p:nvPicPr>
         <p:blipFill>
-          <a:blip r:embed="rId2"/>
+          <a:blip r:embed="rId2" cstate="print"/>
           <a:stretch>
             <a:fillRect/>
           </a:stretch>
@@ -12847,11 +12665,6 @@
               </a:rPr>
               <a:t>Aktueller Stand:</a:t>
             </a:r>
-            <a:endParaRPr lang="de-DE" b="1" dirty="0" smtClean="0">
-              <a:solidFill>
-                <a:srgbClr val="0B2A51"/>
-              </a:solidFill>
-            </a:endParaRPr>
           </a:p>
           <a:p>
             <a:pPr eaLnBrk="1" hangingPunct="1">
@@ -12957,11 +12770,7 @@
             </a:pPr>
             <a:r>
               <a:rPr lang="de-DE" sz="2600" dirty="0" smtClean="0"/>
-              <a:t> </a:t>
-            </a:r>
-            <a:r>
-              <a:rPr lang="de-DE" sz="2600" dirty="0" smtClean="0"/>
-              <a:t>Team</a:t>
+              <a:t> Team</a:t>
             </a:r>
           </a:p>
           <a:p>
@@ -13205,23 +13014,6 @@
               <a:t> </a:t>
             </a:r>
             <a:r>
-              <a:rPr kumimoji="0" lang="de-DE" sz="1700" b="0" i="0" u="none" strike="noStrike" kern="1200" cap="none" spc="0" normalizeH="0" noProof="0" dirty="0" err="1" smtClean="0">
-                <a:ln>
-                  <a:noFill/>
-                </a:ln>
-                <a:solidFill>
-                  <a:srgbClr val="0B2A51"/>
-                </a:solidFill>
-                <a:effectLst/>
-                <a:uLnTx/>
-                <a:uFillTx/>
-                <a:latin typeface="Verdana" pitchFamily="34" charset="0"/>
-                <a:ea typeface="+mn-ea"/>
-                <a:cs typeface="+mn-cs"/>
-              </a:rPr>
-              <a:t>Beschleunigunswerte</a:t>
-            </a:r>
-            <a:r>
               <a:rPr kumimoji="0" lang="de-DE" sz="1700" b="0" i="0" u="none" strike="noStrike" kern="1200" cap="none" spc="0" normalizeH="0" noProof="0" dirty="0" smtClean="0">
                 <a:ln>
                   <a:noFill/>
@@ -13236,7 +13028,24 @@
                 <a:ea typeface="+mn-ea"/>
                 <a:cs typeface="+mn-cs"/>
               </a:rPr>
-              <a:t> nur bedingt verwendbar</a:t>
+              <a:t>Beschleunigungswerte </a:t>
+            </a:r>
+            <a:r>
+              <a:rPr kumimoji="0" lang="de-DE" sz="1700" b="0" i="0" u="none" strike="noStrike" kern="1200" cap="none" spc="0" normalizeH="0" noProof="0" dirty="0" smtClean="0">
+                <a:ln>
+                  <a:noFill/>
+                </a:ln>
+                <a:solidFill>
+                  <a:srgbClr val="0B2A51"/>
+                </a:solidFill>
+                <a:effectLst/>
+                <a:uLnTx/>
+                <a:uFillTx/>
+                <a:latin typeface="Verdana" pitchFamily="34" charset="0"/>
+                <a:ea typeface="+mn-ea"/>
+                <a:cs typeface="+mn-cs"/>
+              </a:rPr>
+              <a:t>nur bedingt verwendbar</a:t>
             </a:r>
           </a:p>
           <a:p>
@@ -13332,25 +13141,22 @@
           <p:nvPr/>
         </p:nvPicPr>
         <p:blipFill>
-          <a:blip r:embed="rId3"/>
+          <a:blip r:embed="rId3" cstate="print"/>
           <a:stretch>
             <a:fillRect/>
           </a:stretch>
         </p:blipFill>
         <p:spPr bwMode="auto">
           <a:xfrm>
-            <a:off x="0" y="5692807"/>
-            <a:ext cx="9144000" cy="1165194"/>
+            <a:off x="0" y="5692808"/>
+            <a:ext cx="9144000" cy="1753040"/>
           </a:xfrm>
           <a:prstGeom prst="rect">
             <a:avLst/>
           </a:prstGeom>
           <a:noFill/>
-          <a:ln w="9525">
+          <a:ln>
             <a:noFill/>
-            <a:miter lim="800000"/>
-            <a:headEnd/>
-            <a:tailEnd/>
           </a:ln>
         </p:spPr>
       </p:pic>

</xml_diff>